<commit_message>
Update slides for date and location
git-svn-id: https://svn.code.sf.net/p/electricdss/code@2722 d8739450-1e93-4ef4-a0af-c327d92816ff
</commit_message>
<xml_diff>
--- a/trunk/Training/ConEd-2019/Controls.pptx
+++ b/trunk/Training/ConEd-2019/Controls.pptx
@@ -250,7 +250,7 @@
           <a:p>
             <a:fld id="{FF391D5B-F21D-4A23-BC16-77D248A42E04}" type="datetimeFigureOut">
               <a:rPr lang="en-US" smtClean="0"/>
-              <a:t>9/17/2019</a:t>
+              <a:t>10/14/2019</a:t>
             </a:fld>
             <a:endParaRPr lang="en-US"/>
           </a:p>
@@ -415,7 +415,7 @@
           <a:p>
             <a:fld id="{21D603EA-85D6-422C-AB10-17A2A7923832}" type="datetimeFigureOut">
               <a:rPr lang="en-US" smtClean="0"/>
-              <a:t>9/17/2019</a:t>
+              <a:t>10/14/2019</a:t>
             </a:fld>
             <a:endParaRPr lang="en-US" dirty="0"/>
           </a:p>
@@ -11423,7 +11423,7 @@
           <a:p>
             <a:r>
               <a:rPr lang="en-US" b="1" dirty="0"/>
-              <a:t>September 24-25, 2019</a:t>
+              <a:t>October 17-18, 2019</a:t>
             </a:r>
             <a:endParaRPr lang="en-US" dirty="0"/>
           </a:p>
@@ -11474,14 +11474,15 @@
           <a:p>
             <a:r>
               <a:rPr lang="en-US" dirty="0"/>
-              <a:t>Idaho Power Co.</a:t>
-            </a:r>
-          </a:p>
-          <a:p>
-            <a:r>
-              <a:rPr lang="en-US" dirty="0"/>
-              <a:t>Boise, Idaho</a:t>
-            </a:r>
+              <a:t>Consolidated Edison Co.</a:t>
+            </a:r>
+          </a:p>
+          <a:p>
+            <a:r>
+              <a:rPr lang="en-US"/>
+              <a:t>New York, NY</a:t>
+            </a:r>
+            <a:endParaRPr lang="en-US" dirty="0"/>
           </a:p>
         </p:txBody>
       </p:sp>
@@ -18741,23 +18742,6 @@
 </file>
 
 <file path=customXml/item1.xml><?xml version="1.0" encoding="utf-8"?>
-<p:properties xmlns:p="http://schemas.microsoft.com/office/2006/metadata/properties" xmlns:xsi="http://www.w3.org/2001/XMLSchema-instance" xmlns:pc="http://schemas.microsoft.com/office/infopath/2007/PartnerControls">
-  <documentManagement>
-    <Category xmlns="9d4eb815-23ed-48d9-b0c1-2b9ce0016f4e">EPRI PowerPoint Template</Category>
-  </documentManagement>
-</p:properties>
-</file>
-
-<file path=customXml/item2.xml><?xml version="1.0" encoding="utf-8"?>
-<?mso-contentType ?>
-<FormTemplates xmlns="http://schemas.microsoft.com/sharepoint/v3/contenttype/forms">
-  <Display>DocumentLibraryForm</Display>
-  <Edit>DocumentLibraryForm</Edit>
-  <New>DocumentLibraryForm</New>
-</FormTemplates>
-</file>
-
-<file path=customXml/item3.xml><?xml version="1.0" encoding="utf-8"?>
 <ct:contentTypeSchema xmlns:ct="http://schemas.microsoft.com/office/2006/metadata/contentType" xmlns:ma="http://schemas.microsoft.com/office/2006/metadata/properties/metaAttributes" ct:_="" ma:_="" ma:contentTypeName="Document" ma:contentTypeID="0x010100D67101F030D76349B9BDDCB7E839049A" ma:contentTypeVersion="1" ma:contentTypeDescription="Create a new document." ma:contentTypeScope="" ma:versionID="734fc11b70f2696fea1b768389187637">
   <xsd:schema xmlns:xsd="http://www.w3.org/2001/XMLSchema" xmlns:xs="http://www.w3.org/2001/XMLSchema" xmlns:p="http://schemas.microsoft.com/office/2006/metadata/properties" xmlns:ns2="9d4eb815-23ed-48d9-b0c1-2b9ce0016f4e" targetNamespace="http://schemas.microsoft.com/office/2006/metadata/properties" ma:root="true" ma:fieldsID="2b4a09c436e99444c649b2400fdb07dc" ns2:_="">
     <xsd:import namespace="9d4eb815-23ed-48d9-b0c1-2b9ce0016f4e"/>
@@ -18889,31 +18873,24 @@
 </ct:contentTypeSchema>
 </file>
 
-<file path=customXml/itemProps1.xml><?xml version="1.0" encoding="utf-8"?>
-<ds:datastoreItem xmlns:ds="http://schemas.openxmlformats.org/officeDocument/2006/customXml" ds:itemID="{45521A8B-3986-40B6-95DF-B5A721DA9604}">
-  <ds:schemaRefs>
-    <ds:schemaRef ds:uri="http://purl.org/dc/terms/"/>
-    <ds:schemaRef ds:uri="9d4eb815-23ed-48d9-b0c1-2b9ce0016f4e"/>
-    <ds:schemaRef ds:uri="http://schemas.microsoft.com/office/2006/documentManagement/types"/>
-    <ds:schemaRef ds:uri="http://schemas.openxmlformats.org/package/2006/metadata/core-properties"/>
-    <ds:schemaRef ds:uri="http://purl.org/dc/elements/1.1/"/>
-    <ds:schemaRef ds:uri="http://www.w3.org/XML/1998/namespace"/>
-    <ds:schemaRef ds:uri="http://schemas.microsoft.com/office/infopath/2007/PartnerControls"/>
-    <ds:schemaRef ds:uri="http://schemas.microsoft.com/office/2006/metadata/properties"/>
-    <ds:schemaRef ds:uri="http://purl.org/dc/dcmitype/"/>
-  </ds:schemaRefs>
-</ds:datastoreItem>
+<file path=customXml/item2.xml><?xml version="1.0" encoding="utf-8"?>
+<?mso-contentType ?>
+<FormTemplates xmlns="http://schemas.microsoft.com/sharepoint/v3/contenttype/forms">
+  <Display>DocumentLibraryForm</Display>
+  <Edit>DocumentLibraryForm</Edit>
+  <New>DocumentLibraryForm</New>
+</FormTemplates>
 </file>
 
-<file path=customXml/itemProps2.xml><?xml version="1.0" encoding="utf-8"?>
-<ds:datastoreItem xmlns:ds="http://schemas.openxmlformats.org/officeDocument/2006/customXml" ds:itemID="{B9E07810-A7D8-4B3A-A78F-4052749F2489}">
-  <ds:schemaRefs>
-    <ds:schemaRef ds:uri="http://schemas.microsoft.com/sharepoint/v3/contenttype/forms"/>
-  </ds:schemaRefs>
-</ds:datastoreItem>
+<file path=customXml/item3.xml><?xml version="1.0" encoding="utf-8"?>
+<p:properties xmlns:p="http://schemas.microsoft.com/office/2006/metadata/properties" xmlns:xsi="http://www.w3.org/2001/XMLSchema-instance" xmlns:pc="http://schemas.microsoft.com/office/infopath/2007/PartnerControls">
+  <documentManagement>
+    <Category xmlns="9d4eb815-23ed-48d9-b0c1-2b9ce0016f4e">EPRI PowerPoint Template</Category>
+  </documentManagement>
+</p:properties>
 </file>
 
-<file path=customXml/itemProps3.xml><?xml version="1.0" encoding="utf-8"?>
+<file path=customXml/itemProps1.xml><?xml version="1.0" encoding="utf-8"?>
 <ds:datastoreItem xmlns:ds="http://schemas.openxmlformats.org/officeDocument/2006/customXml" ds:itemID="{9F8FDBBD-CE4F-4A8C-8C02-158CA41BCB1D}">
   <ds:schemaRefs>
     <ds:schemaRef ds:uri="http://schemas.microsoft.com/office/2006/metadata/contentType"/>
@@ -18929,4 +18906,28 @@
     <ds:schemaRef ds:uri="http://schemas.microsoft.com/internal/obd"/>
   </ds:schemaRefs>
 </ds:datastoreItem>
+</file>
+
+<file path=customXml/itemProps2.xml><?xml version="1.0" encoding="utf-8"?>
+<ds:datastoreItem xmlns:ds="http://schemas.openxmlformats.org/officeDocument/2006/customXml" ds:itemID="{B9E07810-A7D8-4B3A-A78F-4052749F2489}">
+  <ds:schemaRefs>
+    <ds:schemaRef ds:uri="http://schemas.microsoft.com/sharepoint/v3/contenttype/forms"/>
+  </ds:schemaRefs>
+</ds:datastoreItem>
+</file>
+
+<file path=customXml/itemProps3.xml><?xml version="1.0" encoding="utf-8"?>
+<ds:datastoreItem xmlns:ds="http://schemas.openxmlformats.org/officeDocument/2006/customXml" ds:itemID="{45521A8B-3986-40B6-95DF-B5A721DA9604}">
+  <ds:schemaRefs>
+    <ds:schemaRef ds:uri="http://purl.org/dc/terms/"/>
+    <ds:schemaRef ds:uri="9d4eb815-23ed-48d9-b0c1-2b9ce0016f4e"/>
+    <ds:schemaRef ds:uri="http://schemas.microsoft.com/office/2006/documentManagement/types"/>
+    <ds:schemaRef ds:uri="http://schemas.openxmlformats.org/package/2006/metadata/core-properties"/>
+    <ds:schemaRef ds:uri="http://purl.org/dc/elements/1.1/"/>
+    <ds:schemaRef ds:uri="http://www.w3.org/XML/1998/namespace"/>
+    <ds:schemaRef ds:uri="http://schemas.microsoft.com/office/infopath/2007/PartnerControls"/>
+    <ds:schemaRef ds:uri="http://schemas.microsoft.com/office/2006/metadata/properties"/>
+    <ds:schemaRef ds:uri="http://purl.org/dc/dcmitype/"/>
+  </ds:schemaRefs>
+</ds:datastoreItem>
 </file>
</xml_diff>